<commit_message>
minore uopdates in in the slides. Update data timestamp starting from 2021-09-14 12:00 GMT
</commit_message>
<xml_diff>
--- a/Training-material/day 1/00_intro.pptx
+++ b/Training-material/day 1/00_intro.pptx
@@ -8,8 +8,7 @@
     <p:sldId id="1137" r:id="rId2"/>
     <p:sldId id="1159" r:id="rId3"/>
     <p:sldId id="1163" r:id="rId4"/>
-    <p:sldId id="1164" r:id="rId5"/>
-    <p:sldId id="1162" r:id="rId6"/>
+    <p:sldId id="1162" r:id="rId5"/>
   </p:sldIdLst>
   <p:sldSz cx="12192000" cy="6858000"/>
   <p:notesSz cx="6858000" cy="9144000"/>
@@ -2212,7 +2211,7 @@
                 <a:tabLst/>
                 <a:defRPr/>
               </a:pPr>
-              <a:t>‹#›</a:t>
+              <a:t>‹N›</a:t>
             </a:fld>
             <a:endParaRPr lang="en-US" sz="900" dirty="0">
               <a:solidFill>
@@ -2610,10 +2609,10 @@
       </p:sp>
       <p:sp>
         <p:nvSpPr>
-          <p:cNvPr id="7" name="Subtitle 1">
+          <p:cNvPr id="5" name="Subtitle 1">
             <a:extLst>
               <a:ext uri="{FF2B5EF4-FFF2-40B4-BE49-F238E27FC236}">
-                <a16:creationId xmlns:a16="http://schemas.microsoft.com/office/drawing/2014/main" id="{5BA3759C-D039-C44D-A6DE-5BEAC4DF4576}"/>
+                <a16:creationId xmlns:a16="http://schemas.microsoft.com/office/drawing/2014/main" id="{4C280130-6F83-B043-AF72-7FBB55B29348}"/>
               </a:ext>
             </a:extLst>
           </p:cNvPr>
@@ -2625,7 +2624,7 @@
         <p:spPr>
           <a:xfrm>
             <a:off x="960229" y="4725451"/>
-            <a:ext cx="5297138" cy="777687"/>
+            <a:ext cx="5297138" cy="1182189"/>
           </a:xfrm>
           <a:prstGeom prst="rect">
             <a:avLst/>
@@ -2912,7 +2911,7 @@
                 <a:cs typeface="Helvetica Neue Light"/>
                 <a:sym typeface="Helvetica Neue Light"/>
               </a:rPr>
-              <a:t>Emanuele Della Valle</a:t>
+              <a:t>Alessio Bernardo</a:t>
             </a:r>
           </a:p>
           <a:p>
@@ -2932,17 +2931,31 @@
                 <a:cs typeface="Helvetica Neue Light"/>
                 <a:sym typeface="Helvetica Neue Light"/>
               </a:rPr>
-              <a:t>Prof. @ </a:t>
-            </a:r>
-            <a:r>
-              <a:rPr lang="en" dirty="0" err="1">
+              <a:t>PhD Student @ Politecnico di Milano </a:t>
+            </a:r>
+          </a:p>
+          <a:p>
+            <a:pPr marL="177800" indent="-177800">
+              <a:spcBef>
+                <a:spcPts val="0"/>
+              </a:spcBef>
+            </a:pPr>
+            <a:r>
+              <a:rPr lang="it-IT" b="1" dirty="0">
                 <a:latin typeface="Helvetica Neue Light"/>
                 <a:ea typeface="Helvetica Neue Light"/>
                 <a:cs typeface="Helvetica Neue Light"/>
                 <a:sym typeface="Helvetica Neue Light"/>
               </a:rPr>
-              <a:t>Politecnico</a:t>
-            </a:r>
+              <a:t>Emanuele Falzone</a:t>
+            </a:r>
+          </a:p>
+          <a:p>
+            <a:pPr marL="177800" indent="-177800">
+              <a:spcBef>
+                <a:spcPts val="0"/>
+              </a:spcBef>
+            </a:pPr>
             <a:r>
               <a:rPr lang="en" dirty="0">
                 <a:latin typeface="Helvetica Neue Light"/>
@@ -2950,166 +2963,13 @@
                 <a:cs typeface="Helvetica Neue Light"/>
                 <a:sym typeface="Helvetica Neue Light"/>
               </a:rPr>
-              <a:t> di Milano </a:t>
-            </a:r>
-          </a:p>
-          <a:p>
-            <a:pPr marL="177800" indent="-177800">
-              <a:spcBef>
-                <a:spcPts val="0"/>
-              </a:spcBef>
-              <a:buClr>
-                <a:schemeClr val="lt1"/>
-              </a:buClr>
-              <a:buSzPts val="1800"/>
-            </a:pPr>
-            <a:r>
-              <a:rPr lang="en" dirty="0">
-                <a:latin typeface="Helvetica Neue Light"/>
-                <a:ea typeface="Helvetica Neue Light"/>
-                <a:cs typeface="Helvetica Neue Light"/>
-                <a:sym typeface="Helvetica Neue Light"/>
-              </a:rPr>
-              <a:t>Founder &amp; Partner @ </a:t>
-            </a:r>
-            <a:r>
-              <a:rPr lang="en" dirty="0" err="1">
-                <a:latin typeface="Helvetica Neue Light"/>
-                <a:ea typeface="Helvetica Neue Light"/>
-                <a:cs typeface="Helvetica Neue Light"/>
-                <a:sym typeface="Helvetica Neue Light"/>
-              </a:rPr>
-              <a:t>Quantia</a:t>
-            </a:r>
-            <a:r>
-              <a:rPr lang="en" dirty="0">
-                <a:latin typeface="Helvetica Neue Light"/>
-                <a:ea typeface="Helvetica Neue Light"/>
-                <a:cs typeface="Helvetica Neue Light"/>
-                <a:sym typeface="Helvetica Neue Light"/>
-              </a:rPr>
-              <a:t> Consulting</a:t>
-            </a:r>
-          </a:p>
-          <a:p>
-            <a:pPr marL="177800" indent="-177800">
-              <a:spcBef>
-                <a:spcPts val="0"/>
-              </a:spcBef>
-            </a:pPr>
-            <a:r>
-              <a:rPr lang="it-IT" b="1" dirty="0">
-                <a:latin typeface="Helvetica Neue Light"/>
-                <a:ea typeface="Helvetica Neue Light"/>
-                <a:cs typeface="Helvetica Neue Light"/>
-                <a:sym typeface="Helvetica Neue Light"/>
-              </a:rPr>
-              <a:t>Marco Balduini</a:t>
-            </a:r>
-          </a:p>
-          <a:p>
-            <a:pPr marL="177800" indent="-177800">
-              <a:spcBef>
-                <a:spcPts val="0"/>
-              </a:spcBef>
-            </a:pPr>
-            <a:r>
-              <a:rPr lang="it-IT" dirty="0" err="1">
-                <a:latin typeface="Helvetica Neue Light"/>
-                <a:ea typeface="Helvetica Neue Light"/>
-                <a:cs typeface="Helvetica Neue Light"/>
-                <a:sym typeface="Helvetica Neue Light"/>
-              </a:rPr>
-              <a:t>Founder</a:t>
-            </a:r>
-            <a:r>
-              <a:rPr lang="it-IT" dirty="0">
-                <a:latin typeface="Helvetica Neue Light"/>
-                <a:ea typeface="Helvetica Neue Light"/>
-                <a:cs typeface="Helvetica Neue Light"/>
-                <a:sym typeface="Helvetica Neue Light"/>
-              </a:rPr>
-              <a:t> &amp; CEO @ </a:t>
-            </a:r>
-            <a:r>
-              <a:rPr lang="it-IT" dirty="0" err="1">
-                <a:latin typeface="Helvetica Neue Light"/>
-                <a:ea typeface="Helvetica Neue Light"/>
-                <a:cs typeface="Helvetica Neue Light"/>
-                <a:sym typeface="Helvetica Neue Light"/>
-              </a:rPr>
-              <a:t>Quantia</a:t>
-            </a:r>
-            <a:r>
-              <a:rPr lang="it-IT" dirty="0">
-                <a:latin typeface="Helvetica Neue Light"/>
-                <a:ea typeface="Helvetica Neue Light"/>
-                <a:cs typeface="Helvetica Neue Light"/>
-                <a:sym typeface="Helvetica Neue Light"/>
-              </a:rPr>
-              <a:t> </a:t>
-            </a:r>
-            <a:r>
-              <a:rPr lang="it-IT" dirty="0" err="1">
-                <a:latin typeface="Helvetica Neue Light"/>
-                <a:ea typeface="Helvetica Neue Light"/>
-                <a:cs typeface="Helvetica Neue Light"/>
-                <a:sym typeface="Helvetica Neue Light"/>
-              </a:rPr>
-              <a:t>Consulting</a:t>
+              <a:t>PhD Student @ Politecnico di Milano</a:t>
             </a:r>
             <a:endParaRPr lang="it-IT" dirty="0">
               <a:latin typeface="Helvetica Neue Light"/>
               <a:ea typeface="Helvetica Neue Light"/>
-              <a:cs typeface="Helvetica Neue Light"/>
               <a:sym typeface="Helvetica Neue Light"/>
             </a:endParaRPr>
-          </a:p>
-          <a:p>
-            <a:pPr marL="177800" indent="-177800">
-              <a:spcBef>
-                <a:spcPts val="0"/>
-              </a:spcBef>
-            </a:pPr>
-            <a:r>
-              <a:rPr lang="it-IT" b="1" dirty="0">
-                <a:latin typeface="Helvetica Neue Light"/>
-                <a:ea typeface="Helvetica Neue Light"/>
-                <a:sym typeface="Helvetica Neue Light"/>
-              </a:rPr>
-              <a:t>Riccardo Tommasini</a:t>
-            </a:r>
-          </a:p>
-          <a:p>
-            <a:pPr marL="100013" indent="-100013">
-              <a:spcBef>
-                <a:spcPts val="0"/>
-              </a:spcBef>
-            </a:pPr>
-            <a:r>
-              <a:rPr lang="it-IT" dirty="0">
-                <a:latin typeface="Helvetica Neue Light"/>
-                <a:ea typeface="Helvetica Neue Light"/>
-                <a:sym typeface="Helvetica Neue Light"/>
-              </a:rPr>
-              <a:t>Prof. @ </a:t>
-            </a:r>
-            <a:r>
-              <a:rPr lang="it-IT" dirty="0" err="1">
-                <a:latin typeface="Helvetica Neue Light"/>
-                <a:ea typeface="Helvetica Neue Light"/>
-                <a:sym typeface="Helvetica Neue Light"/>
-              </a:rPr>
-              <a:t>University</a:t>
-            </a:r>
-            <a:r>
-              <a:rPr lang="it-IT" dirty="0">
-                <a:latin typeface="Helvetica Neue Light"/>
-                <a:ea typeface="Helvetica Neue Light"/>
-                <a:sym typeface="Helvetica Neue Light"/>
-              </a:rPr>
-              <a:t> of Tartu</a:t>
-            </a:r>
           </a:p>
         </p:txBody>
       </p:sp>
@@ -3173,8 +3033,8 @@
         </p:nvSpPr>
         <p:spPr>
           <a:xfrm>
-            <a:off x="455494" y="1873805"/>
-            <a:ext cx="7422620" cy="1010448"/>
+            <a:off x="455494" y="1873806"/>
+            <a:ext cx="7422620" cy="423864"/>
           </a:xfrm>
         </p:spPr>
         <p:txBody>
@@ -3183,33 +3043,12 @@
           <a:p>
             <a:r>
               <a:rPr lang="en-GB" dirty="0"/>
-              <a:t>Associate Professor | </a:t>
-            </a:r>
-            <a:r>
-              <a:rPr lang="en-GB" b="1" dirty="0" err="1"/>
-              <a:t>Politecnico</a:t>
+              <a:t>Ph.D. Student | </a:t>
             </a:r>
             <a:r>
               <a:rPr lang="en-GB" b="1" dirty="0"/>
-              <a:t> di Milano</a:t>
-            </a:r>
-          </a:p>
-          <a:p>
-            <a:r>
-              <a:rPr lang="en-GB" dirty="0"/>
-              <a:t>Founder &amp; Partner | </a:t>
-            </a:r>
-            <a:r>
-              <a:rPr lang="en-GB" b="1" dirty="0" err="1"/>
-              <a:t>Quantia</a:t>
-            </a:r>
-            <a:r>
-              <a:rPr lang="en-GB" b="1" dirty="0"/>
-              <a:t> Consulting</a:t>
-            </a:r>
-          </a:p>
-          <a:p>
-            <a:endParaRPr lang="en-GB" b="1" dirty="0"/>
+              <a:t>Politecnico di Milano</a:t>
+            </a:r>
           </a:p>
           <a:p>
             <a:endParaRPr lang="en-US" dirty="0"/>
@@ -3235,7 +3074,7 @@
         <p:spPr>
           <a:xfrm>
             <a:off x="416262" y="55089"/>
-            <a:ext cx="7422621" cy="1289625"/>
+            <a:ext cx="8429787" cy="1289625"/>
           </a:xfrm>
         </p:spPr>
         <p:txBody>
@@ -3244,7 +3083,7 @@
           <a:p>
             <a:r>
               <a:rPr lang="en-GB" dirty="0"/>
-              <a:t>Emanuele Della Valle, PhD</a:t>
+              <a:t>Alessio Bernardo, M.Sc.</a:t>
             </a:r>
             <a:endParaRPr lang="en-US" dirty="0"/>
           </a:p>
@@ -3285,24 +3124,17 @@
               <a:buNone/>
             </a:pPr>
             <a:r>
-              <a:rPr lang="en-GB" sz="1400" dirty="0" err="1">
+              <a:rPr lang="en-GB" sz="1400" dirty="0">
                 <a:solidFill>
                   <a:prstClr val="black">
                     <a:tint val="75000"/>
                   </a:prstClr>
                 </a:solidFill>
+                <a:latin typeface="+mn-lt"/>
                 <a:ea typeface="+mn-ea"/>
               </a:rPr>
-              <a:t>emanuele.dellavalle@quantiaconsulting.com</a:t>
-            </a:r>
-            <a:endParaRPr lang="en-GB" sz="1400" dirty="0">
-              <a:solidFill>
-                <a:prstClr val="black">
-                  <a:tint val="75000"/>
-                </a:prstClr>
-              </a:solidFill>
-              <a:ea typeface="+mn-ea"/>
-            </a:endParaRPr>
+              <a:t>alessio.bernardo@polimi.it</a:t>
+            </a:r>
           </a:p>
           <a:p>
             <a:pPr marL="0" indent="0" defTabSz="914400">
@@ -3318,31 +3150,10 @@
                     <a:tint val="75000"/>
                   </a:prstClr>
                 </a:solidFill>
+                <a:latin typeface="+mn-lt"/>
                 <a:ea typeface="+mn-ea"/>
               </a:rPr>
-              <a:t>@</a:t>
-            </a:r>
-            <a:r>
-              <a:rPr lang="en-GB" sz="1400" dirty="0" err="1">
-                <a:solidFill>
-                  <a:prstClr val="black">
-                    <a:tint val="75000"/>
-                  </a:prstClr>
-                </a:solidFill>
-                <a:ea typeface="+mn-ea"/>
-              </a:rPr>
-              <a:t>manudellavalle</a:t>
-            </a:r>
-            <a:r>
-              <a:rPr lang="en-GB" sz="1400" dirty="0">
-                <a:solidFill>
-                  <a:prstClr val="black">
-                    <a:tint val="75000"/>
-                  </a:prstClr>
-                </a:solidFill>
-                <a:ea typeface="+mn-ea"/>
-              </a:rPr>
-              <a:t> </a:t>
+              <a:t>@alebernardo94 </a:t>
             </a:r>
           </a:p>
           <a:p>
@@ -3359,69 +3170,10 @@
                     <a:tint val="75000"/>
                   </a:prstClr>
                 </a:solidFill>
+                <a:latin typeface="+mn-lt"/>
                 <a:ea typeface="+mn-ea"/>
               </a:rPr>
-              <a:t>http://</a:t>
-            </a:r>
-            <a:r>
-              <a:rPr lang="en-GB" sz="1400" dirty="0" err="1">
-                <a:solidFill>
-                  <a:prstClr val="black">
-                    <a:tint val="75000"/>
-                  </a:prstClr>
-                </a:solidFill>
-                <a:ea typeface="+mn-ea"/>
-              </a:rPr>
-              <a:t>emanueledellavalle.org</a:t>
-            </a:r>
-            <a:endParaRPr lang="en-GB" sz="1400" dirty="0">
-              <a:solidFill>
-                <a:prstClr val="black">
-                  <a:tint val="75000"/>
-                </a:prstClr>
-              </a:solidFill>
-              <a:ea typeface="+mn-ea"/>
-            </a:endParaRPr>
-          </a:p>
-          <a:p>
-            <a:pPr marL="0" indent="0" defTabSz="914400">
-              <a:lnSpc>
-                <a:spcPct val="90000"/>
-              </a:lnSpc>
-              <a:buNone/>
-            </a:pPr>
-            <a:r>
-              <a:rPr lang="en-GB" sz="1400" dirty="0">
-                <a:solidFill>
-                  <a:prstClr val="black">
-                    <a:tint val="75000"/>
-                  </a:prstClr>
-                </a:solidFill>
-                <a:ea typeface="+mn-ea"/>
-              </a:rPr>
-              <a:t>https://</a:t>
-            </a:r>
-            <a:r>
-              <a:rPr lang="en-GB" sz="1400" dirty="0" err="1">
-                <a:solidFill>
-                  <a:prstClr val="black">
-                    <a:tint val="75000"/>
-                  </a:prstClr>
-                </a:solidFill>
-                <a:ea typeface="+mn-ea"/>
-              </a:rPr>
-              <a:t>www.quantiaconsulting.com</a:t>
-            </a:r>
-            <a:r>
-              <a:rPr lang="en-GB" sz="1400" dirty="0">
-                <a:solidFill>
-                  <a:prstClr val="black">
-                    <a:tint val="75000"/>
-                  </a:prstClr>
-                </a:solidFill>
-                <a:ea typeface="+mn-ea"/>
-              </a:rPr>
-              <a:t> </a:t>
+              <a:t>https://alessiobernardo.github.io/</a:t>
             </a:r>
           </a:p>
         </p:txBody>
@@ -3482,13 +3234,13 @@
         </p:nvSpPr>
         <p:spPr>
           <a:xfrm>
-            <a:off x="662852" y="3168157"/>
+            <a:off x="662851" y="2727753"/>
             <a:ext cx="6929437" cy="1025525"/>
           </a:xfrm>
         </p:spPr>
         <p:txBody>
           <a:bodyPr>
-            <a:normAutofit fontScale="85000" lnSpcReduction="20000"/>
+            <a:normAutofit lnSpcReduction="10000"/>
           </a:bodyPr>
           <a:lstStyle/>
           <a:p>
@@ -3507,8 +3259,25 @@
                 <a:ea typeface="+mn-ea"/>
                 <a:cs typeface="+mn-cs"/>
               </a:rPr>
-              <a:t>Expert in semantic technologies and stream computing </a:t>
-            </a:r>
+              <a:t>Expert in </a:t>
+            </a:r>
+            <a:r>
+              <a:rPr lang="en-GB" sz="1400" dirty="0">
+                <a:solidFill>
+                  <a:schemeClr val="tx1"/>
+                </a:solidFill>
+                <a:latin typeface="+mn-lt"/>
+              </a:rPr>
+              <a:t>streaming data processing and time evolving analytic</a:t>
+            </a:r>
+            <a:endParaRPr lang="en-GB" sz="1400" dirty="0">
+              <a:solidFill>
+                <a:schemeClr val="tx1"/>
+              </a:solidFill>
+              <a:latin typeface="+mn-lt"/>
+              <a:ea typeface="+mn-ea"/>
+              <a:cs typeface="+mn-cs"/>
+            </a:endParaRPr>
           </a:p>
           <a:p>
             <a:pPr marL="0" indent="0" defTabSz="914400">
@@ -3526,7 +3295,7 @@
                 <a:ea typeface="+mn-ea"/>
                 <a:cs typeface="+mn-cs"/>
               </a:rPr>
-              <a:t>Brander of stream reasoning: an approach to master the velocity and  variety dimension of Big Data blending stream processing and AI</a:t>
+              <a:t>Contributor of MOA</a:t>
             </a:r>
           </a:p>
           <a:p>
@@ -3545,7 +3314,7 @@
                 <a:ea typeface="+mn-ea"/>
                 <a:cs typeface="+mn-cs"/>
               </a:rPr>
-              <a:t>+20 years experience in innovation and research projects</a:t>
+              <a:t>~3 years experience in innovation and research projects</a:t>
             </a:r>
             <a:endParaRPr lang="en-US" sz="1400" dirty="0">
               <a:solidFill>
@@ -3558,53 +3327,6 @@
           </a:p>
         </p:txBody>
       </p:sp>
-      <p:pic>
-        <p:nvPicPr>
-          <p:cNvPr id="1028" name="Picture 4" descr="Emanuele Della Valle's photo">
-            <a:extLst>
-              <a:ext uri="{FF2B5EF4-FFF2-40B4-BE49-F238E27FC236}">
-                <a16:creationId xmlns:a16="http://schemas.microsoft.com/office/drawing/2014/main" id="{638C7C59-536E-F147-A0E6-9A5F2035157B}"/>
-              </a:ext>
-            </a:extLst>
-          </p:cNvPr>
-          <p:cNvPicPr>
-            <a:picLocks noGrp="1" noChangeAspect="1" noChangeArrowheads="1"/>
-          </p:cNvPicPr>
-          <p:nvPr>
-            <p:ph type="pic" sz="quarter" idx="4294967295"/>
-          </p:nvPr>
-        </p:nvPicPr>
-        <p:blipFill rotWithShape="1">
-          <a:blip r:embed="rId2">
-            <a:extLst>
-              <a:ext uri="{28A0092B-C50C-407E-A947-70E740481C1C}">
-                <a14:useLocalDpi xmlns:a14="http://schemas.microsoft.com/office/drawing/2010/main" val="0"/>
-              </a:ext>
-            </a:extLst>
-          </a:blip>
-          <a:srcRect l="4365" t="-319" r="18707" b="319"/>
-          <a:stretch/>
-        </p:blipFill>
-        <p:spPr bwMode="auto">
-          <a:xfrm>
-            <a:off x="9154573" y="148406"/>
-            <a:ext cx="2912736" cy="3786281"/>
-          </a:xfrm>
-          <a:prstGeom prst="rect">
-            <a:avLst/>
-          </a:prstGeom>
-          <a:noFill/>
-          <a:extLst>
-            <a:ext uri="{909E8E84-426E-40DD-AFC4-6F175D3DCCD1}">
-              <a14:hiddenFill xmlns:a14="http://schemas.microsoft.com/office/drawing/2010/main">
-                <a:solidFill>
-                  <a:srgbClr val="FFFFFF"/>
-                </a:solidFill>
-              </a14:hiddenFill>
-            </a:ext>
-          </a:extLst>
-        </p:spPr>
-      </p:pic>
       <p:cxnSp>
         <p:nvCxnSpPr>
           <p:cNvPr id="8" name="Straight Connector 7">
@@ -3648,6 +3370,37 @@
           </a:fontRef>
         </p:style>
       </p:cxnSp>
+      <p:pic>
+        <p:nvPicPr>
+          <p:cNvPr id="9" name="Google Shape;69;p14">
+            <a:extLst>
+              <a:ext uri="{FF2B5EF4-FFF2-40B4-BE49-F238E27FC236}">
+                <a16:creationId xmlns:a16="http://schemas.microsoft.com/office/drawing/2014/main" id="{482F038C-22A1-8F49-AD30-F78CA8038FAD}"/>
+              </a:ext>
+            </a:extLst>
+          </p:cNvPr>
+          <p:cNvPicPr preferRelativeResize="0"/>
+          <p:nvPr/>
+        </p:nvPicPr>
+        <p:blipFill rotWithShape="1">
+          <a:blip r:embed="rId2"/>
+          <a:srcRect l="18587" r="15350" b="40978"/>
+          <a:stretch/>
+        </p:blipFill>
+        <p:spPr>
+          <a:xfrm>
+            <a:off x="9310062" y="599638"/>
+            <a:ext cx="2635358" cy="3027139"/>
+          </a:xfrm>
+          <a:prstGeom prst="rect">
+            <a:avLst/>
+          </a:prstGeom>
+          <a:noFill/>
+          <a:ln>
+            <a:noFill/>
+          </a:ln>
+        </p:spPr>
+      </p:pic>
     </p:spTree>
     <p:extLst>
       <p:ext uri="{BB962C8B-B14F-4D97-AF65-F5344CB8AC3E}">
@@ -3692,50 +3445,6 @@
       </p:grpSpPr>
       <p:sp>
         <p:nvSpPr>
-          <p:cNvPr id="3" name="Content Placeholder 2">
-            <a:extLst>
-              <a:ext uri="{FF2B5EF4-FFF2-40B4-BE49-F238E27FC236}">
-                <a16:creationId xmlns:a16="http://schemas.microsoft.com/office/drawing/2014/main" id="{F384CB93-04BB-F448-933B-206811FF149C}"/>
-              </a:ext>
-            </a:extLst>
-          </p:cNvPr>
-          <p:cNvSpPr>
-            <a:spLocks noGrp="1"/>
-          </p:cNvSpPr>
-          <p:nvPr>
-            <p:ph type="subTitle" idx="1"/>
-          </p:nvPr>
-        </p:nvSpPr>
-        <p:spPr>
-          <a:xfrm>
-            <a:off x="455494" y="1873805"/>
-            <a:ext cx="7422620" cy="1010448"/>
-          </a:xfrm>
-        </p:spPr>
-        <p:txBody>
-          <a:bodyPr/>
-          <a:lstStyle/>
-          <a:p>
-            <a:r>
-              <a:rPr lang="en-GB" dirty="0"/>
-              <a:t>Founder &amp; CEO | </a:t>
-            </a:r>
-            <a:r>
-              <a:rPr lang="en-GB" b="1" dirty="0" err="1"/>
-              <a:t>Quantia</a:t>
-            </a:r>
-            <a:r>
-              <a:rPr lang="en-GB" b="1" dirty="0"/>
-              <a:t> Consulting</a:t>
-            </a:r>
-          </a:p>
-          <a:p>
-            <a:endParaRPr lang="en-US" dirty="0"/>
-          </a:p>
-        </p:txBody>
-      </p:sp>
-      <p:sp>
-        <p:nvSpPr>
           <p:cNvPr id="2" name="Title 1">
             <a:extLst>
               <a:ext uri="{FF2B5EF4-FFF2-40B4-BE49-F238E27FC236}">
@@ -3762,15 +3471,7 @@
           <a:p>
             <a:r>
               <a:rPr lang="en-GB" dirty="0"/>
-              <a:t>Marco </a:t>
-            </a:r>
-            <a:r>
-              <a:rPr lang="en-GB" dirty="0" err="1"/>
-              <a:t>Balduini</a:t>
-            </a:r>
-            <a:r>
-              <a:rPr lang="en-GB" dirty="0"/>
-              <a:t>, PhD</a:t>
+              <a:t>Emanuele Falzone, M.Sc.</a:t>
             </a:r>
             <a:endParaRPr lang="en-US" dirty="0"/>
           </a:p>
@@ -3819,7 +3520,7 @@
                 </a:solidFill>
                 <a:ea typeface="+mn-ea"/>
               </a:rPr>
-              <a:t>marco.balduini@quantiaconsulting.com</a:t>
+              <a:t>emanuele.falzone@polimi.it</a:t>
             </a:r>
             <a:endParaRPr lang="en-GB" sz="1400" dirty="0">
               <a:solidFill>
@@ -3829,107 +3530,6 @@
               </a:solidFill>
               <a:ea typeface="+mn-ea"/>
             </a:endParaRPr>
-          </a:p>
-          <a:p>
-            <a:pPr marL="0" indent="0" defTabSz="914400">
-              <a:lnSpc>
-                <a:spcPct val="90000"/>
-              </a:lnSpc>
-              <a:buNone/>
-            </a:pPr>
-            <a:r>
-              <a:rPr lang="en-GB" sz="1400" dirty="0">
-                <a:solidFill>
-                  <a:prstClr val="black">
-                    <a:tint val="75000"/>
-                  </a:prstClr>
-                </a:solidFill>
-                <a:ea typeface="+mn-ea"/>
-              </a:rPr>
-              <a:t>@balducci85 </a:t>
-            </a:r>
-          </a:p>
-          <a:p>
-            <a:pPr marL="0" indent="0" defTabSz="914400">
-              <a:lnSpc>
-                <a:spcPct val="90000"/>
-              </a:lnSpc>
-              <a:buNone/>
-            </a:pPr>
-            <a:r>
-              <a:rPr lang="en-GB" sz="1400" dirty="0">
-                <a:solidFill>
-                  <a:prstClr val="black">
-                    <a:tint val="75000"/>
-                  </a:prstClr>
-                </a:solidFill>
-                <a:ea typeface="+mn-ea"/>
-              </a:rPr>
-              <a:t>https://</a:t>
-            </a:r>
-            <a:r>
-              <a:rPr lang="en-GB" sz="1400" dirty="0" err="1">
-                <a:solidFill>
-                  <a:prstClr val="black">
-                    <a:tint val="75000"/>
-                  </a:prstClr>
-                </a:solidFill>
-                <a:ea typeface="+mn-ea"/>
-              </a:rPr>
-              <a:t>marcobalduini.com</a:t>
-            </a:r>
-            <a:r>
-              <a:rPr lang="en-GB" sz="1400" dirty="0">
-                <a:solidFill>
-                  <a:prstClr val="black">
-                    <a:tint val="75000"/>
-                  </a:prstClr>
-                </a:solidFill>
-                <a:ea typeface="+mn-ea"/>
-              </a:rPr>
-              <a:t>/</a:t>
-            </a:r>
-          </a:p>
-          <a:p>
-            <a:pPr marL="0" indent="0" defTabSz="914400">
-              <a:lnSpc>
-                <a:spcPct val="90000"/>
-              </a:lnSpc>
-              <a:buNone/>
-            </a:pPr>
-            <a:r>
-              <a:rPr lang="en-GB" sz="1400" dirty="0">
-                <a:solidFill>
-                  <a:prstClr val="black">
-                    <a:tint val="75000"/>
-                  </a:prstClr>
-                </a:solidFill>
-                <a:ea typeface="+mn-ea"/>
-              </a:rPr>
-              <a:t>https://</a:t>
-            </a:r>
-            <a:r>
-              <a:rPr lang="en-GB" sz="1400" dirty="0" err="1">
-                <a:solidFill>
-                  <a:prstClr val="black">
-                    <a:tint val="75000"/>
-                  </a:prstClr>
-                </a:solidFill>
-                <a:ea typeface="+mn-ea"/>
-              </a:rPr>
-              <a:t>www.quantiaconsulting.com</a:t>
-            </a:r>
-            <a:r>
-              <a:rPr lang="en-GB" sz="1400" dirty="0">
-                <a:solidFill>
-                  <a:prstClr val="black">
-                    <a:tint val="75000"/>
-                  </a:prstClr>
-                </a:solidFill>
-                <a:ea typeface="+mn-ea"/>
-              </a:rPr>
-              <a:t> </a:t>
-            </a:r>
           </a:p>
         </p:txBody>
       </p:sp>
@@ -3968,638 +3568,6 @@
               <a:rPr lang="en-US" dirty="0"/>
               <a:t>Contact</a:t>
             </a:r>
-          </a:p>
-        </p:txBody>
-      </p:sp>
-      <p:sp>
-        <p:nvSpPr>
-          <p:cNvPr id="7" name="Content Placeholder 6">
-            <a:extLst>
-              <a:ext uri="{FF2B5EF4-FFF2-40B4-BE49-F238E27FC236}">
-                <a16:creationId xmlns:a16="http://schemas.microsoft.com/office/drawing/2014/main" id="{AA1A1CA9-D044-884B-875E-3056BA7AC786}"/>
-              </a:ext>
-            </a:extLst>
-          </p:cNvPr>
-          <p:cNvSpPr>
-            <a:spLocks noGrp="1"/>
-          </p:cNvSpPr>
-          <p:nvPr>
-            <p:ph sz="quarter" idx="4294967295"/>
-          </p:nvPr>
-        </p:nvSpPr>
-        <p:spPr>
-          <a:xfrm>
-            <a:off x="662851" y="2680336"/>
-            <a:ext cx="6929437" cy="1025525"/>
-          </a:xfrm>
-        </p:spPr>
-        <p:txBody>
-          <a:bodyPr>
-            <a:normAutofit fontScale="85000" lnSpcReduction="10000"/>
-          </a:bodyPr>
-          <a:lstStyle/>
-          <a:p>
-            <a:pPr marL="0" indent="0" defTabSz="914400">
-              <a:lnSpc>
-                <a:spcPct val="110000"/>
-              </a:lnSpc>
-              <a:buNone/>
-            </a:pPr>
-            <a:r>
-              <a:rPr lang="en-GB" sz="1400" dirty="0">
-                <a:solidFill>
-                  <a:schemeClr val="tx1"/>
-                </a:solidFill>
-                <a:latin typeface="+mn-lt"/>
-                <a:ea typeface="+mn-ea"/>
-                <a:cs typeface="+mn-cs"/>
-              </a:rPr>
-              <a:t>Expert in data processing, data integration and data science technologies</a:t>
-            </a:r>
-          </a:p>
-          <a:p>
-            <a:pPr marL="0" indent="0" defTabSz="914400">
-              <a:lnSpc>
-                <a:spcPct val="110000"/>
-              </a:lnSpc>
-              <a:buNone/>
-            </a:pPr>
-            <a:r>
-              <a:rPr lang="en-GB" sz="1400" dirty="0">
-                <a:solidFill>
-                  <a:schemeClr val="tx1"/>
-                </a:solidFill>
-                <a:latin typeface="+mn-lt"/>
-                <a:ea typeface="+mn-ea"/>
-                <a:cs typeface="+mn-cs"/>
-              </a:rPr>
-              <a:t>Main contributor of the C-SPARQL Engine, author of Streaming Linked Data framework and </a:t>
-            </a:r>
-            <a:r>
-              <a:rPr lang="en-GB" sz="1400" dirty="0" err="1">
-                <a:solidFill>
-                  <a:schemeClr val="tx1"/>
-                </a:solidFill>
-                <a:latin typeface="+mn-lt"/>
-                <a:ea typeface="+mn-ea"/>
-                <a:cs typeface="+mn-cs"/>
-              </a:rPr>
-              <a:t>FraPPE</a:t>
-            </a:r>
-            <a:r>
-              <a:rPr lang="en-GB" sz="1400" dirty="0">
-                <a:solidFill>
-                  <a:schemeClr val="tx1"/>
-                </a:solidFill>
-                <a:latin typeface="+mn-lt"/>
-                <a:ea typeface="+mn-ea"/>
-                <a:cs typeface="+mn-cs"/>
-              </a:rPr>
-              <a:t> ontology</a:t>
-            </a:r>
-          </a:p>
-          <a:p>
-            <a:pPr marL="0" indent="0" defTabSz="914400">
-              <a:lnSpc>
-                <a:spcPct val="110000"/>
-              </a:lnSpc>
-              <a:buNone/>
-            </a:pPr>
-            <a:r>
-              <a:rPr lang="en-GB" sz="1400" dirty="0">
-                <a:solidFill>
-                  <a:schemeClr val="tx1"/>
-                </a:solidFill>
-                <a:latin typeface="+mn-lt"/>
-                <a:ea typeface="+mn-ea"/>
-                <a:cs typeface="+mn-cs"/>
-              </a:rPr>
-              <a:t>~10 years experience in innovation and research projects</a:t>
-            </a:r>
-          </a:p>
-          <a:p>
-            <a:pPr marL="0" indent="0" defTabSz="914400">
-              <a:lnSpc>
-                <a:spcPct val="110000"/>
-              </a:lnSpc>
-              <a:buNone/>
-            </a:pPr>
-            <a:endParaRPr lang="en-US" sz="1400" dirty="0">
-              <a:solidFill>
-                <a:schemeClr val="tx1"/>
-              </a:solidFill>
-              <a:latin typeface="+mn-lt"/>
-              <a:ea typeface="+mn-ea"/>
-              <a:cs typeface="+mn-cs"/>
-            </a:endParaRPr>
-          </a:p>
-        </p:txBody>
-      </p:sp>
-      <p:pic>
-        <p:nvPicPr>
-          <p:cNvPr id="1028" name="Picture 4">
-            <a:extLst>
-              <a:ext uri="{FF2B5EF4-FFF2-40B4-BE49-F238E27FC236}">
-                <a16:creationId xmlns:a16="http://schemas.microsoft.com/office/drawing/2014/main" id="{638C7C59-536E-F147-A0E6-9A5F2035157B}"/>
-              </a:ext>
-            </a:extLst>
-          </p:cNvPr>
-          <p:cNvPicPr>
-            <a:picLocks noGrp="1" noChangeAspect="1" noChangeArrowheads="1"/>
-          </p:cNvPicPr>
-          <p:nvPr>
-            <p:ph type="pic" sz="quarter" idx="4294967295"/>
-          </p:nvPr>
-        </p:nvPicPr>
-        <p:blipFill>
-          <a:blip r:embed="rId2"/>
-          <a:srcRect l="11536" r="11536"/>
-          <a:stretch/>
-        </p:blipFill>
-        <p:spPr bwMode="auto">
-          <a:xfrm>
-            <a:off x="9154573" y="148406"/>
-            <a:ext cx="2912736" cy="3786281"/>
-          </a:xfrm>
-          <a:prstGeom prst="rect">
-            <a:avLst/>
-          </a:prstGeom>
-          <a:noFill/>
-          <a:extLst>
-            <a:ext uri="{909E8E84-426E-40DD-AFC4-6F175D3DCCD1}">
-              <a14:hiddenFill xmlns:a14="http://schemas.microsoft.com/office/drawing/2010/main">
-                <a:solidFill>
-                  <a:srgbClr val="FFFFFF"/>
-                </a:solidFill>
-              </a14:hiddenFill>
-            </a:ext>
-          </a:extLst>
-        </p:spPr>
-      </p:pic>
-      <p:cxnSp>
-        <p:nvCxnSpPr>
-          <p:cNvPr id="8" name="Straight Connector 7">
-            <a:extLst>
-              <a:ext uri="{FF2B5EF4-FFF2-40B4-BE49-F238E27FC236}">
-                <a16:creationId xmlns:a16="http://schemas.microsoft.com/office/drawing/2014/main" id="{410F6E9C-F6F0-034D-9165-77B875F02BFA}"/>
-              </a:ext>
-            </a:extLst>
-          </p:cNvPr>
-          <p:cNvCxnSpPr>
-            <a:cxnSpLocks/>
-          </p:cNvCxnSpPr>
-          <p:nvPr/>
-        </p:nvCxnSpPr>
-        <p:spPr>
-          <a:xfrm>
-            <a:off x="252547" y="4049455"/>
-            <a:ext cx="6929434" cy="0"/>
-          </a:xfrm>
-          <a:prstGeom prst="line">
-            <a:avLst/>
-          </a:prstGeom>
-          <a:ln>
-            <a:solidFill>
-              <a:schemeClr val="accent6"/>
-            </a:solidFill>
-          </a:ln>
-        </p:spPr>
-        <p:style>
-          <a:lnRef idx="1">
-            <a:schemeClr val="accent1"/>
-          </a:lnRef>
-          <a:fillRef idx="0">
-            <a:schemeClr val="accent1"/>
-          </a:fillRef>
-          <a:effectRef idx="0">
-            <a:schemeClr val="accent1"/>
-          </a:effectRef>
-          <a:fontRef idx="minor">
-            <a:schemeClr val="tx1"/>
-          </a:fontRef>
-        </p:style>
-      </p:cxnSp>
-    </p:spTree>
-    <p:extLst>
-      <p:ext uri="{BB962C8B-B14F-4D97-AF65-F5344CB8AC3E}">
-        <p14:creationId xmlns:p14="http://schemas.microsoft.com/office/powerpoint/2010/main" val="3181699665"/>
-      </p:ext>
-    </p:extLst>
-  </p:cSld>
-  <p:clrMapOvr>
-    <a:masterClrMapping/>
-  </p:clrMapOvr>
-  <mc:AlternateContent xmlns:mc="http://schemas.openxmlformats.org/markup-compatibility/2006" xmlns:p14="http://schemas.microsoft.com/office/powerpoint/2010/main">
-    <mc:Choice Requires="p14">
-      <p:transition spd="med" p14:dur="700">
-        <p:fade/>
-      </p:transition>
-    </mc:Choice>
-    <mc:Fallback xmlns="">
-      <p:transition spd="med">
-        <p:fade/>
-      </p:transition>
-    </mc:Fallback>
-  </mc:AlternateContent>
-</p:sld>
-</file>
-
-<file path=ppt/slides/slide4.xml><?xml version="1.0" encoding="utf-8"?>
-<p:sld xmlns:a="http://schemas.openxmlformats.org/drawingml/2006/main" xmlns:r="http://schemas.openxmlformats.org/officeDocument/2006/relationships" xmlns:p="http://schemas.openxmlformats.org/presentationml/2006/main">
-  <p:cSld>
-    <p:spTree>
-      <p:nvGrpSpPr>
-        <p:cNvPr id="1" name=""/>
-        <p:cNvGrpSpPr/>
-        <p:nvPr/>
-      </p:nvGrpSpPr>
-      <p:grpSpPr>
-        <a:xfrm>
-          <a:off x="0" y="0"/>
-          <a:ext cx="0" cy="0"/>
-          <a:chOff x="0" y="0"/>
-          <a:chExt cx="0" cy="0"/>
-        </a:xfrm>
-      </p:grpSpPr>
-      <p:sp>
-        <p:nvSpPr>
-          <p:cNvPr id="3" name="Content Placeholder 2">
-            <a:extLst>
-              <a:ext uri="{FF2B5EF4-FFF2-40B4-BE49-F238E27FC236}">
-                <a16:creationId xmlns:a16="http://schemas.microsoft.com/office/drawing/2014/main" id="{F384CB93-04BB-F448-933B-206811FF149C}"/>
-              </a:ext>
-            </a:extLst>
-          </p:cNvPr>
-          <p:cNvSpPr>
-            <a:spLocks noGrp="1"/>
-          </p:cNvSpPr>
-          <p:nvPr>
-            <p:ph type="subTitle" idx="1"/>
-          </p:nvPr>
-        </p:nvSpPr>
-        <p:spPr>
-          <a:xfrm>
-            <a:off x="455494" y="1873805"/>
-            <a:ext cx="7422620" cy="1010448"/>
-          </a:xfrm>
-        </p:spPr>
-        <p:txBody>
-          <a:bodyPr/>
-          <a:lstStyle/>
-          <a:p>
-            <a:r>
-              <a:rPr lang="en-US" dirty="0"/>
-              <a:t>Assistant Professor </a:t>
-            </a:r>
-            <a:r>
-              <a:rPr lang="en-GB" dirty="0"/>
-              <a:t>| </a:t>
-            </a:r>
-            <a:r>
-              <a:rPr lang="en-GB" b="1" dirty="0"/>
-              <a:t>University of Tartu (Estonia)</a:t>
-            </a:r>
-          </a:p>
-          <a:p>
-            <a:endParaRPr lang="en-US" dirty="0"/>
-          </a:p>
-        </p:txBody>
-      </p:sp>
-      <p:sp>
-        <p:nvSpPr>
-          <p:cNvPr id="2" name="Title 1">
-            <a:extLst>
-              <a:ext uri="{FF2B5EF4-FFF2-40B4-BE49-F238E27FC236}">
-                <a16:creationId xmlns:a16="http://schemas.microsoft.com/office/drawing/2014/main" id="{53C99693-AD6C-AE46-B840-9D9DD8BAEB57}"/>
-              </a:ext>
-            </a:extLst>
-          </p:cNvPr>
-          <p:cNvSpPr>
-            <a:spLocks noGrp="1"/>
-          </p:cNvSpPr>
-          <p:nvPr>
-            <p:ph type="title"/>
-          </p:nvPr>
-        </p:nvSpPr>
-        <p:spPr>
-          <a:xfrm>
-            <a:off x="416262" y="55089"/>
-            <a:ext cx="7422621" cy="1289625"/>
-          </a:xfrm>
-        </p:spPr>
-        <p:txBody>
-          <a:bodyPr/>
-          <a:lstStyle/>
-          <a:p>
-            <a:r>
-              <a:rPr lang="en-US" dirty="0"/>
-              <a:t>Riccardo </a:t>
-            </a:r>
-            <a:r>
-              <a:rPr lang="en-US" dirty="0" err="1"/>
-              <a:t>Tommasini</a:t>
-            </a:r>
-            <a:r>
-              <a:rPr lang="en-US" dirty="0"/>
-              <a:t>, PhD</a:t>
-            </a:r>
-          </a:p>
-        </p:txBody>
-      </p:sp>
-      <p:sp>
-        <p:nvSpPr>
-          <p:cNvPr id="4" name="Content Placeholder 3">
-            <a:extLst>
-              <a:ext uri="{FF2B5EF4-FFF2-40B4-BE49-F238E27FC236}">
-                <a16:creationId xmlns:a16="http://schemas.microsoft.com/office/drawing/2014/main" id="{F857F5C6-B5A8-5E4E-BEF1-722E4F0BAF24}"/>
-              </a:ext>
-            </a:extLst>
-          </p:cNvPr>
-          <p:cNvSpPr>
-            <a:spLocks noGrp="1"/>
-          </p:cNvSpPr>
-          <p:nvPr>
-            <p:ph sz="quarter" idx="4294967295"/>
-          </p:nvPr>
-        </p:nvSpPr>
-        <p:spPr>
-          <a:xfrm>
-            <a:off x="662851" y="4988642"/>
-            <a:ext cx="6929437" cy="1481138"/>
-          </a:xfrm>
-        </p:spPr>
-        <p:txBody>
-          <a:bodyPr>
-            <a:normAutofit/>
-          </a:bodyPr>
-          <a:lstStyle/>
-          <a:p>
-            <a:pPr marL="0" indent="0" defTabSz="914400">
-              <a:lnSpc>
-                <a:spcPct val="90000"/>
-              </a:lnSpc>
-              <a:buNone/>
-            </a:pPr>
-            <a:r>
-              <a:rPr lang="en-GB" sz="1400" dirty="0" err="1">
-                <a:solidFill>
-                  <a:prstClr val="black">
-                    <a:tint val="75000"/>
-                  </a:prstClr>
-                </a:solidFill>
-                <a:ea typeface="+mn-ea"/>
-              </a:rPr>
-              <a:t>riccardo.tommasini@quantiaconsulting.com</a:t>
-            </a:r>
-            <a:endParaRPr lang="en-GB" sz="1400" dirty="0">
-              <a:solidFill>
-                <a:prstClr val="black">
-                  <a:tint val="75000"/>
-                </a:prstClr>
-              </a:solidFill>
-              <a:ea typeface="+mn-ea"/>
-            </a:endParaRPr>
-          </a:p>
-          <a:p>
-            <a:pPr marL="0" indent="0" defTabSz="914400">
-              <a:lnSpc>
-                <a:spcPct val="90000"/>
-              </a:lnSpc>
-              <a:buNone/>
-            </a:pPr>
-            <a:r>
-              <a:rPr lang="en-GB" sz="1400" dirty="0">
-                <a:solidFill>
-                  <a:prstClr val="black">
-                    <a:tint val="75000"/>
-                  </a:prstClr>
-                </a:solidFill>
-                <a:ea typeface="+mn-ea"/>
-              </a:rPr>
-              <a:t>@</a:t>
-            </a:r>
-            <a:r>
-              <a:rPr lang="en-GB" sz="1400" dirty="0" err="1">
-                <a:solidFill>
-                  <a:prstClr val="black">
-                    <a:tint val="75000"/>
-                  </a:prstClr>
-                </a:solidFill>
-                <a:ea typeface="+mn-ea"/>
-              </a:rPr>
-              <a:t>rictomm</a:t>
-            </a:r>
-            <a:endParaRPr lang="en-GB" sz="1400" dirty="0">
-              <a:solidFill>
-                <a:prstClr val="black">
-                  <a:tint val="75000"/>
-                </a:prstClr>
-              </a:solidFill>
-              <a:ea typeface="+mn-ea"/>
-            </a:endParaRPr>
-          </a:p>
-          <a:p>
-            <a:pPr marL="0" indent="0" defTabSz="914400">
-              <a:lnSpc>
-                <a:spcPct val="90000"/>
-              </a:lnSpc>
-              <a:buNone/>
-            </a:pPr>
-            <a:r>
-              <a:rPr lang="en-GB" sz="1400" dirty="0">
-                <a:solidFill>
-                  <a:prstClr val="black">
-                    <a:tint val="75000"/>
-                  </a:prstClr>
-                </a:solidFill>
-                <a:ea typeface="+mn-ea"/>
-              </a:rPr>
-              <a:t>https://</a:t>
-            </a:r>
-            <a:r>
-              <a:rPr lang="en-GB" sz="1400" dirty="0" err="1">
-                <a:solidFill>
-                  <a:prstClr val="black">
-                    <a:tint val="75000"/>
-                  </a:prstClr>
-                </a:solidFill>
-                <a:ea typeface="+mn-ea"/>
-              </a:rPr>
-              <a:t>riccardotommasini.com</a:t>
-            </a:r>
-            <a:r>
-              <a:rPr lang="en-GB" sz="1400" dirty="0">
-                <a:solidFill>
-                  <a:prstClr val="black">
-                    <a:tint val="75000"/>
-                  </a:prstClr>
-                </a:solidFill>
-                <a:ea typeface="+mn-ea"/>
-              </a:rPr>
-              <a:t>/</a:t>
-            </a:r>
-          </a:p>
-        </p:txBody>
-      </p:sp>
-      <p:sp>
-        <p:nvSpPr>
-          <p:cNvPr id="5" name="Content Placeholder 4">
-            <a:extLst>
-              <a:ext uri="{FF2B5EF4-FFF2-40B4-BE49-F238E27FC236}">
-                <a16:creationId xmlns:a16="http://schemas.microsoft.com/office/drawing/2014/main" id="{49309ADA-15F8-2C4A-BD3F-D5AB3295100A}"/>
-              </a:ext>
-            </a:extLst>
-          </p:cNvPr>
-          <p:cNvSpPr>
-            <a:spLocks noGrp="1"/>
-          </p:cNvSpPr>
-          <p:nvPr>
-            <p:ph sz="quarter" idx="4294967295"/>
-          </p:nvPr>
-        </p:nvSpPr>
-        <p:spPr>
-          <a:xfrm>
-            <a:off x="662851" y="4512392"/>
-            <a:ext cx="6929437" cy="423863"/>
-          </a:xfrm>
-        </p:spPr>
-        <p:txBody>
-          <a:bodyPr>
-            <a:normAutofit fontScale="92500" lnSpcReduction="20000"/>
-          </a:bodyPr>
-          <a:lstStyle/>
-          <a:p>
-            <a:pPr marL="0" indent="0">
-              <a:buNone/>
-            </a:pPr>
-            <a:r>
-              <a:rPr lang="en-US" dirty="0"/>
-              <a:t>Contact</a:t>
-            </a:r>
-          </a:p>
-        </p:txBody>
-      </p:sp>
-      <p:sp>
-        <p:nvSpPr>
-          <p:cNvPr id="7" name="Content Placeholder 6">
-            <a:extLst>
-              <a:ext uri="{FF2B5EF4-FFF2-40B4-BE49-F238E27FC236}">
-                <a16:creationId xmlns:a16="http://schemas.microsoft.com/office/drawing/2014/main" id="{AA1A1CA9-D044-884B-875E-3056BA7AC786}"/>
-              </a:ext>
-            </a:extLst>
-          </p:cNvPr>
-          <p:cNvSpPr>
-            <a:spLocks noGrp="1"/>
-          </p:cNvSpPr>
-          <p:nvPr>
-            <p:ph sz="quarter" idx="4294967295"/>
-          </p:nvPr>
-        </p:nvSpPr>
-        <p:spPr>
-          <a:xfrm>
-            <a:off x="662851" y="2680336"/>
-            <a:ext cx="6929437" cy="1025525"/>
-          </a:xfrm>
-        </p:spPr>
-        <p:txBody>
-          <a:bodyPr>
-            <a:normAutofit lnSpcReduction="10000"/>
-          </a:bodyPr>
-          <a:lstStyle/>
-          <a:p>
-            <a:pPr marL="0" indent="0" defTabSz="914400">
-              <a:lnSpc>
-                <a:spcPct val="110000"/>
-              </a:lnSpc>
-              <a:buNone/>
-            </a:pPr>
-            <a:r>
-              <a:rPr lang="en-GB" sz="1400" dirty="0">
-                <a:solidFill>
-                  <a:schemeClr val="tx1"/>
-                </a:solidFill>
-                <a:latin typeface="+mn-lt"/>
-                <a:ea typeface="+mn-ea"/>
-                <a:cs typeface="+mn-cs"/>
-              </a:rPr>
-              <a:t>Expert in graph and streaming data processing, data integration and semantic technologies</a:t>
-            </a:r>
-          </a:p>
-          <a:p>
-            <a:pPr marL="0" indent="0" defTabSz="914400">
-              <a:lnSpc>
-                <a:spcPct val="110000"/>
-              </a:lnSpc>
-              <a:buNone/>
-            </a:pPr>
-            <a:r>
-              <a:rPr lang="en-GB" sz="1400" dirty="0">
-                <a:solidFill>
-                  <a:schemeClr val="tx1"/>
-                </a:solidFill>
-                <a:latin typeface="+mn-lt"/>
-                <a:ea typeface="+mn-ea"/>
-                <a:cs typeface="+mn-cs"/>
-              </a:rPr>
-              <a:t>Main contributor of the RSP-QL stack Engine, author of </a:t>
-            </a:r>
-            <a:r>
-              <a:rPr lang="en-GB" sz="1400" dirty="0" err="1">
-                <a:solidFill>
-                  <a:schemeClr val="tx1"/>
-                </a:solidFill>
-                <a:latin typeface="+mn-lt"/>
-                <a:ea typeface="+mn-ea"/>
-                <a:cs typeface="+mn-cs"/>
-              </a:rPr>
-              <a:t>VoCaLS</a:t>
-            </a:r>
-            <a:r>
-              <a:rPr lang="en-GB" sz="1400" dirty="0">
-                <a:solidFill>
-                  <a:schemeClr val="tx1"/>
-                </a:solidFill>
-                <a:latin typeface="+mn-lt"/>
-                <a:ea typeface="+mn-ea"/>
-                <a:cs typeface="+mn-cs"/>
-              </a:rPr>
-              <a:t> ontology</a:t>
-            </a:r>
-          </a:p>
-          <a:p>
-            <a:pPr marL="0" indent="0" defTabSz="914400">
-              <a:lnSpc>
-                <a:spcPct val="110000"/>
-              </a:lnSpc>
-              <a:buNone/>
-            </a:pPr>
-            <a:r>
-              <a:rPr lang="en-GB" sz="1400" dirty="0">
-                <a:solidFill>
-                  <a:schemeClr val="tx1"/>
-                </a:solidFill>
-                <a:latin typeface="+mn-lt"/>
-                <a:ea typeface="+mn-ea"/>
-                <a:cs typeface="+mn-cs"/>
-              </a:rPr>
-              <a:t>~5 years experience in innovation and research projects</a:t>
-            </a:r>
-          </a:p>
-          <a:p>
-            <a:pPr marL="0" indent="0" defTabSz="914400">
-              <a:lnSpc>
-                <a:spcPct val="110000"/>
-              </a:lnSpc>
-              <a:buNone/>
-            </a:pPr>
-            <a:endParaRPr lang="en-US" sz="1400" dirty="0">
-              <a:solidFill>
-                <a:schemeClr val="tx1"/>
-              </a:solidFill>
-              <a:latin typeface="+mn-lt"/>
-              <a:ea typeface="+mn-ea"/>
-              <a:cs typeface="+mn-cs"/>
-            </a:endParaRPr>
           </a:p>
         </p:txBody>
       </p:sp>
@@ -4646,57 +3614,510 @@
           </a:fontRef>
         </p:style>
       </p:cxnSp>
-      <p:pic>
-        <p:nvPicPr>
-          <p:cNvPr id="10" name="Picture 2" descr="Riccardo Tommasini">
+      <p:sp>
+        <p:nvSpPr>
+          <p:cNvPr id="11" name="Content Placeholder 2">
             <a:extLst>
               <a:ext uri="{FF2B5EF4-FFF2-40B4-BE49-F238E27FC236}">
-                <a16:creationId xmlns:a16="http://schemas.microsoft.com/office/drawing/2014/main" id="{BE7F2543-C762-E24F-AE1E-D516176D8745}"/>
+                <a16:creationId xmlns:a16="http://schemas.microsoft.com/office/drawing/2014/main" id="{E8F1A9F8-C718-B349-A1DD-9A6FB4F50AD0}"/>
               </a:ext>
             </a:extLst>
           </p:cNvPr>
-          <p:cNvPicPr>
-            <a:picLocks noChangeAspect="1" noChangeArrowheads="1"/>
-          </p:cNvPicPr>
+          <p:cNvSpPr txBox="1">
+            <a:spLocks/>
+          </p:cNvSpPr>
+          <p:nvPr/>
+        </p:nvSpPr>
+        <p:spPr>
+          <a:xfrm>
+            <a:off x="455494" y="1873806"/>
+            <a:ext cx="7422620" cy="423864"/>
+          </a:xfrm>
+          <a:prstGeom prst="rect">
+            <a:avLst/>
+          </a:prstGeom>
+        </p:spPr>
+        <p:txBody>
+          <a:bodyPr vert="horz" lIns="0" tIns="0" rIns="0" bIns="0" rtlCol="0" anchor="t" anchorCtr="0">
+            <a:noAutofit/>
+          </a:bodyPr>
+          <a:lstStyle>
+            <a:lvl1pPr marL="228594" indent="-228594" algn="l" defTabSz="914377" rtl="0" eaLnBrk="1" latinLnBrk="0" hangingPunct="1">
+              <a:lnSpc>
+                <a:spcPct val="100000"/>
+              </a:lnSpc>
+              <a:spcBef>
+                <a:spcPts val="1000"/>
+              </a:spcBef>
+              <a:buClrTx/>
+              <a:buSzPct val="100000"/>
+              <a:buFont typeface="Arial" charset="0"/>
+              <a:buNone/>
+              <a:tabLst/>
+              <a:defRPr lang="en-US" sz="2400" b="0" i="0" kern="1200" cap="none" spc="0" baseline="0" dirty="0">
+                <a:solidFill>
+                  <a:srgbClr val="282C32"/>
+                </a:solidFill>
+                <a:latin typeface="Rubik" pitchFamily="2" charset="-79"/>
+                <a:ea typeface="Helvetica Neue" charset="0"/>
+                <a:cs typeface="Rubik" pitchFamily="2" charset="-79"/>
+              </a:defRPr>
+            </a:lvl1pPr>
+            <a:lvl2pPr marL="800080" indent="-342891" algn="l" defTabSz="914377" rtl="0" eaLnBrk="1" latinLnBrk="0" hangingPunct="1">
+              <a:lnSpc>
+                <a:spcPct val="100000"/>
+              </a:lnSpc>
+              <a:spcBef>
+                <a:spcPts val="500"/>
+              </a:spcBef>
+              <a:buClrTx/>
+              <a:buFont typeface="Helvetica" charset="-52"/>
+              <a:buChar char="–"/>
+              <a:tabLst/>
+              <a:defRPr sz="2400" b="0" i="0" kern="1200">
+                <a:solidFill>
+                  <a:srgbClr val="2C2C38"/>
+                </a:solidFill>
+                <a:latin typeface="Rubik" pitchFamily="2" charset="-79"/>
+                <a:ea typeface="Helvetica Neue" charset="0"/>
+                <a:cs typeface="Rubik" pitchFamily="2" charset="-79"/>
+              </a:defRPr>
+            </a:lvl2pPr>
+            <a:lvl3pPr marL="1142971" indent="-228594" algn="l" defTabSz="914377" rtl="0" eaLnBrk="1" latinLnBrk="0" hangingPunct="1">
+              <a:lnSpc>
+                <a:spcPct val="100000"/>
+              </a:lnSpc>
+              <a:spcBef>
+                <a:spcPts val="500"/>
+              </a:spcBef>
+              <a:buClrTx/>
+              <a:buFont typeface="Arial" charset="0"/>
+              <a:buChar char="•"/>
+              <a:tabLst/>
+              <a:defRPr sz="2000" b="0" i="0" kern="1200">
+                <a:solidFill>
+                  <a:srgbClr val="2C2C38"/>
+                </a:solidFill>
+                <a:latin typeface="Rubik" pitchFamily="2" charset="-79"/>
+                <a:ea typeface="Helvetica Neue" charset="0"/>
+                <a:cs typeface="Rubik" pitchFamily="2" charset="-79"/>
+              </a:defRPr>
+            </a:lvl3pPr>
+            <a:lvl4pPr marL="1600160" indent="-228594" algn="l" defTabSz="914377" rtl="0" eaLnBrk="1" latinLnBrk="0" hangingPunct="1">
+              <a:lnSpc>
+                <a:spcPct val="100000"/>
+              </a:lnSpc>
+              <a:spcBef>
+                <a:spcPts val="500"/>
+              </a:spcBef>
+              <a:buClrTx/>
+              <a:buFont typeface="LucidaGrande" charset="0"/>
+              <a:buChar char="▫︎"/>
+              <a:defRPr sz="1800" b="0" i="0" kern="1200">
+                <a:solidFill>
+                  <a:srgbClr val="2C2C38"/>
+                </a:solidFill>
+                <a:latin typeface="Rubik" pitchFamily="2" charset="-79"/>
+                <a:ea typeface="Helvetica Neue" charset="0"/>
+                <a:cs typeface="Rubik" pitchFamily="2" charset="-79"/>
+              </a:defRPr>
+            </a:lvl4pPr>
+            <a:lvl5pPr marL="2057349" indent="-228594" algn="l" defTabSz="914377" rtl="0" eaLnBrk="1" latinLnBrk="0" hangingPunct="1">
+              <a:lnSpc>
+                <a:spcPct val="100000"/>
+              </a:lnSpc>
+              <a:spcBef>
+                <a:spcPts val="500"/>
+              </a:spcBef>
+              <a:buClrTx/>
+              <a:buFont typeface=".AppleSystemUIFont" charset="-120"/>
+              <a:buChar char="-"/>
+              <a:defRPr sz="1800" b="0" i="0" kern="1200">
+                <a:solidFill>
+                  <a:srgbClr val="2C2C38"/>
+                </a:solidFill>
+                <a:latin typeface="Rubik" pitchFamily="2" charset="-79"/>
+                <a:ea typeface="Helvetica Neue" charset="0"/>
+                <a:cs typeface="Rubik" pitchFamily="2" charset="-79"/>
+              </a:defRPr>
+            </a:lvl5pPr>
+            <a:lvl6pPr marL="2514537" indent="-228594" algn="l" defTabSz="914377" rtl="0" eaLnBrk="1" latinLnBrk="0" hangingPunct="1">
+              <a:lnSpc>
+                <a:spcPct val="90000"/>
+              </a:lnSpc>
+              <a:spcBef>
+                <a:spcPts val="500"/>
+              </a:spcBef>
+              <a:buFont typeface="Arial"/>
+              <a:buChar char="•"/>
+              <a:defRPr sz="1800" kern="1200">
+                <a:solidFill>
+                  <a:schemeClr val="tx1"/>
+                </a:solidFill>
+                <a:latin typeface="+mn-lt"/>
+                <a:ea typeface="+mn-ea"/>
+                <a:cs typeface="+mn-cs"/>
+              </a:defRPr>
+            </a:lvl6pPr>
+            <a:lvl7pPr marL="2971726" indent="-228594" algn="l" defTabSz="914377" rtl="0" eaLnBrk="1" latinLnBrk="0" hangingPunct="1">
+              <a:lnSpc>
+                <a:spcPct val="90000"/>
+              </a:lnSpc>
+              <a:spcBef>
+                <a:spcPts val="500"/>
+              </a:spcBef>
+              <a:buFont typeface="Arial"/>
+              <a:buChar char="•"/>
+              <a:defRPr sz="1800" kern="1200">
+                <a:solidFill>
+                  <a:schemeClr val="tx1"/>
+                </a:solidFill>
+                <a:latin typeface="+mn-lt"/>
+                <a:ea typeface="+mn-ea"/>
+                <a:cs typeface="+mn-cs"/>
+              </a:defRPr>
+            </a:lvl7pPr>
+            <a:lvl8pPr marL="3428914" indent="-228594" algn="l" defTabSz="914377" rtl="0" eaLnBrk="1" latinLnBrk="0" hangingPunct="1">
+              <a:lnSpc>
+                <a:spcPct val="90000"/>
+              </a:lnSpc>
+              <a:spcBef>
+                <a:spcPts val="500"/>
+              </a:spcBef>
+              <a:buFont typeface="Arial"/>
+              <a:buChar char="•"/>
+              <a:defRPr sz="1800" kern="1200">
+                <a:solidFill>
+                  <a:schemeClr val="tx1"/>
+                </a:solidFill>
+                <a:latin typeface="+mn-lt"/>
+                <a:ea typeface="+mn-ea"/>
+                <a:cs typeface="+mn-cs"/>
+              </a:defRPr>
+            </a:lvl8pPr>
+            <a:lvl9pPr marL="3886103" indent="-228594" algn="l" defTabSz="914377" rtl="0" eaLnBrk="1" latinLnBrk="0" hangingPunct="1">
+              <a:lnSpc>
+                <a:spcPct val="90000"/>
+              </a:lnSpc>
+              <a:spcBef>
+                <a:spcPts val="500"/>
+              </a:spcBef>
+              <a:buFont typeface="Arial"/>
+              <a:buChar char="•"/>
+              <a:defRPr sz="1800" kern="1200">
+                <a:solidFill>
+                  <a:schemeClr val="tx1"/>
+                </a:solidFill>
+                <a:latin typeface="+mn-lt"/>
+                <a:ea typeface="+mn-ea"/>
+                <a:cs typeface="+mn-cs"/>
+              </a:defRPr>
+            </a:lvl9pPr>
+          </a:lstStyle>
+          <a:p>
+            <a:r>
+              <a:rPr lang="en-GB"/>
+              <a:t>Ph.D. Student | </a:t>
+            </a:r>
+            <a:r>
+              <a:rPr lang="en-GB" b="1"/>
+              <a:t>Politecnico di Milano</a:t>
+            </a:r>
+          </a:p>
+          <a:p>
+            <a:endParaRPr lang="en-GB"/>
+          </a:p>
+        </p:txBody>
+      </p:sp>
+      <p:sp>
+        <p:nvSpPr>
+          <p:cNvPr id="12" name="Content Placeholder 6">
+            <a:extLst>
+              <a:ext uri="{FF2B5EF4-FFF2-40B4-BE49-F238E27FC236}">
+                <a16:creationId xmlns:a16="http://schemas.microsoft.com/office/drawing/2014/main" id="{FDE1AF9D-C8E6-4147-A711-7AF54891DC98}"/>
+              </a:ext>
+            </a:extLst>
+          </p:cNvPr>
+          <p:cNvSpPr txBox="1">
+            <a:spLocks/>
+          </p:cNvSpPr>
+          <p:nvPr/>
+        </p:nvSpPr>
+        <p:spPr>
+          <a:xfrm>
+            <a:off x="662851" y="2727753"/>
+            <a:ext cx="6929437" cy="1025525"/>
+          </a:xfrm>
+          <a:prstGeom prst="rect">
+            <a:avLst/>
+          </a:prstGeom>
+        </p:spPr>
+        <p:txBody>
+          <a:bodyPr vert="horz" lIns="91440" tIns="45720" rIns="91440" bIns="45720" rtlCol="0">
+            <a:normAutofit/>
+          </a:bodyPr>
+          <a:lstStyle>
+            <a:lvl1pPr marL="346066" indent="-346066" algn="l" defTabSz="914377" rtl="0" eaLnBrk="1" latinLnBrk="0" hangingPunct="1">
+              <a:lnSpc>
+                <a:spcPct val="100000"/>
+              </a:lnSpc>
+              <a:spcBef>
+                <a:spcPts val="1000"/>
+              </a:spcBef>
+              <a:buClrTx/>
+              <a:buSzPct val="100000"/>
+              <a:buFont typeface="Arial" charset="0"/>
+              <a:buChar char="•"/>
+              <a:tabLst/>
+              <a:defRPr sz="2800" b="0" i="0" kern="1200">
+                <a:solidFill>
+                  <a:srgbClr val="2C2C38"/>
+                </a:solidFill>
+                <a:latin typeface="Rubik" pitchFamily="2" charset="-79"/>
+                <a:ea typeface="Helvetica Neue" charset="0"/>
+                <a:cs typeface="Rubik" pitchFamily="2" charset="-79"/>
+              </a:defRPr>
+            </a:lvl1pPr>
+            <a:lvl2pPr marL="800080" indent="-342891" algn="l" defTabSz="914377" rtl="0" eaLnBrk="1" latinLnBrk="0" hangingPunct="1">
+              <a:lnSpc>
+                <a:spcPct val="100000"/>
+              </a:lnSpc>
+              <a:spcBef>
+                <a:spcPts val="500"/>
+              </a:spcBef>
+              <a:buClrTx/>
+              <a:buFont typeface="Helvetica" charset="-52"/>
+              <a:buChar char="–"/>
+              <a:tabLst/>
+              <a:defRPr sz="2400" b="0" i="0" kern="1200">
+                <a:solidFill>
+                  <a:srgbClr val="2C2C38"/>
+                </a:solidFill>
+                <a:latin typeface="Rubik" pitchFamily="2" charset="-79"/>
+                <a:ea typeface="Helvetica Neue" charset="0"/>
+                <a:cs typeface="Rubik" pitchFamily="2" charset="-79"/>
+              </a:defRPr>
+            </a:lvl2pPr>
+            <a:lvl3pPr marL="1142971" indent="-228594" algn="l" defTabSz="914377" rtl="0" eaLnBrk="1" latinLnBrk="0" hangingPunct="1">
+              <a:lnSpc>
+                <a:spcPct val="100000"/>
+              </a:lnSpc>
+              <a:spcBef>
+                <a:spcPts val="500"/>
+              </a:spcBef>
+              <a:buClrTx/>
+              <a:buFont typeface="Arial" charset="0"/>
+              <a:buChar char="•"/>
+              <a:tabLst/>
+              <a:defRPr sz="2000" b="0" i="0" kern="1200">
+                <a:solidFill>
+                  <a:srgbClr val="2C2C38"/>
+                </a:solidFill>
+                <a:latin typeface="Rubik" pitchFamily="2" charset="-79"/>
+                <a:ea typeface="Helvetica Neue" charset="0"/>
+                <a:cs typeface="Rubik" pitchFamily="2" charset="-79"/>
+              </a:defRPr>
+            </a:lvl3pPr>
+            <a:lvl4pPr marL="1600160" indent="-228594" algn="l" defTabSz="914377" rtl="0" eaLnBrk="1" latinLnBrk="0" hangingPunct="1">
+              <a:lnSpc>
+                <a:spcPct val="100000"/>
+              </a:lnSpc>
+              <a:spcBef>
+                <a:spcPts val="500"/>
+              </a:spcBef>
+              <a:buClrTx/>
+              <a:buFont typeface="LucidaGrande" charset="0"/>
+              <a:buChar char="▫︎"/>
+              <a:defRPr sz="1800" b="0" i="0" kern="1200">
+                <a:solidFill>
+                  <a:srgbClr val="2C2C38"/>
+                </a:solidFill>
+                <a:latin typeface="Rubik" pitchFamily="2" charset="-79"/>
+                <a:ea typeface="Helvetica Neue" charset="0"/>
+                <a:cs typeface="Rubik" pitchFamily="2" charset="-79"/>
+              </a:defRPr>
+            </a:lvl4pPr>
+            <a:lvl5pPr marL="2057349" indent="-228594" algn="l" defTabSz="914377" rtl="0" eaLnBrk="1" latinLnBrk="0" hangingPunct="1">
+              <a:lnSpc>
+                <a:spcPct val="100000"/>
+              </a:lnSpc>
+              <a:spcBef>
+                <a:spcPts val="500"/>
+              </a:spcBef>
+              <a:buClrTx/>
+              <a:buFont typeface=".AppleSystemUIFont" charset="-120"/>
+              <a:buChar char="-"/>
+              <a:defRPr sz="1800" b="0" i="0" kern="1200">
+                <a:solidFill>
+                  <a:srgbClr val="2C2C38"/>
+                </a:solidFill>
+                <a:latin typeface="Rubik" pitchFamily="2" charset="-79"/>
+                <a:ea typeface="Helvetica Neue" charset="0"/>
+                <a:cs typeface="Rubik" pitchFamily="2" charset="-79"/>
+              </a:defRPr>
+            </a:lvl5pPr>
+            <a:lvl6pPr marL="2514537" indent="-228594" algn="l" defTabSz="914377" rtl="0" eaLnBrk="1" latinLnBrk="0" hangingPunct="1">
+              <a:lnSpc>
+                <a:spcPct val="90000"/>
+              </a:lnSpc>
+              <a:spcBef>
+                <a:spcPts val="500"/>
+              </a:spcBef>
+              <a:buFont typeface="Arial"/>
+              <a:buChar char="•"/>
+              <a:defRPr sz="1800" kern="1200">
+                <a:solidFill>
+                  <a:schemeClr val="tx1"/>
+                </a:solidFill>
+                <a:latin typeface="+mn-lt"/>
+                <a:ea typeface="+mn-ea"/>
+                <a:cs typeface="+mn-cs"/>
+              </a:defRPr>
+            </a:lvl6pPr>
+            <a:lvl7pPr marL="2971726" indent="-228594" algn="l" defTabSz="914377" rtl="0" eaLnBrk="1" latinLnBrk="0" hangingPunct="1">
+              <a:lnSpc>
+                <a:spcPct val="90000"/>
+              </a:lnSpc>
+              <a:spcBef>
+                <a:spcPts val="500"/>
+              </a:spcBef>
+              <a:buFont typeface="Arial"/>
+              <a:buChar char="•"/>
+              <a:defRPr sz="1800" kern="1200">
+                <a:solidFill>
+                  <a:schemeClr val="tx1"/>
+                </a:solidFill>
+                <a:latin typeface="+mn-lt"/>
+                <a:ea typeface="+mn-ea"/>
+                <a:cs typeface="+mn-cs"/>
+              </a:defRPr>
+            </a:lvl7pPr>
+            <a:lvl8pPr marL="3428914" indent="-228594" algn="l" defTabSz="914377" rtl="0" eaLnBrk="1" latinLnBrk="0" hangingPunct="1">
+              <a:lnSpc>
+                <a:spcPct val="90000"/>
+              </a:lnSpc>
+              <a:spcBef>
+                <a:spcPts val="500"/>
+              </a:spcBef>
+              <a:buFont typeface="Arial"/>
+              <a:buChar char="•"/>
+              <a:defRPr sz="1800" kern="1200">
+                <a:solidFill>
+                  <a:schemeClr val="tx1"/>
+                </a:solidFill>
+                <a:latin typeface="+mn-lt"/>
+                <a:ea typeface="+mn-ea"/>
+                <a:cs typeface="+mn-cs"/>
+              </a:defRPr>
+            </a:lvl8pPr>
+            <a:lvl9pPr marL="3886103" indent="-228594" algn="l" defTabSz="914377" rtl="0" eaLnBrk="1" latinLnBrk="0" hangingPunct="1">
+              <a:lnSpc>
+                <a:spcPct val="90000"/>
+              </a:lnSpc>
+              <a:spcBef>
+                <a:spcPts val="500"/>
+              </a:spcBef>
+              <a:buFont typeface="Arial"/>
+              <a:buChar char="•"/>
+              <a:defRPr sz="1800" kern="1200">
+                <a:solidFill>
+                  <a:schemeClr val="tx1"/>
+                </a:solidFill>
+                <a:latin typeface="+mn-lt"/>
+                <a:ea typeface="+mn-ea"/>
+                <a:cs typeface="+mn-cs"/>
+              </a:defRPr>
+            </a:lvl9pPr>
+          </a:lstStyle>
+          <a:p>
+            <a:pPr marL="0" indent="0" defTabSz="914400">
+              <a:lnSpc>
+                <a:spcPct val="110000"/>
+              </a:lnSpc>
+              <a:buNone/>
+            </a:pPr>
+            <a:r>
+              <a:rPr lang="en-GB" sz="1400" dirty="0">
+                <a:solidFill>
+                  <a:schemeClr val="tx1"/>
+                </a:solidFill>
+              </a:rPr>
+              <a:t>Expert in graph query languages</a:t>
+            </a:r>
+            <a:endParaRPr lang="en-GB" sz="1400" dirty="0">
+              <a:solidFill>
+                <a:schemeClr val="tx1"/>
+              </a:solidFill>
+              <a:latin typeface="+mn-lt"/>
+              <a:ea typeface="+mn-ea"/>
+              <a:cs typeface="+mn-cs"/>
+            </a:endParaRPr>
+          </a:p>
+          <a:p>
+            <a:pPr marL="0" indent="0" defTabSz="914400">
+              <a:lnSpc>
+                <a:spcPct val="110000"/>
+              </a:lnSpc>
+              <a:buFont typeface="Arial" charset="0"/>
+              <a:buNone/>
+            </a:pPr>
+            <a:r>
+              <a:rPr lang="en-GB" sz="1400" dirty="0">
+                <a:solidFill>
+                  <a:schemeClr val="tx1"/>
+                </a:solidFill>
+                <a:latin typeface="+mn-lt"/>
+                <a:ea typeface="+mn-ea"/>
+                <a:cs typeface="+mn-cs"/>
+              </a:rPr>
+              <a:t>~3 years experience in innovation and research projects</a:t>
+            </a:r>
+            <a:endParaRPr lang="en-US" sz="1400" dirty="0">
+              <a:solidFill>
+                <a:schemeClr val="tx1"/>
+              </a:solidFill>
+              <a:latin typeface="+mn-lt"/>
+              <a:ea typeface="+mn-ea"/>
+              <a:cs typeface="+mn-cs"/>
+            </a:endParaRPr>
+          </a:p>
+        </p:txBody>
+      </p:sp>
+      <p:pic>
+        <p:nvPicPr>
+          <p:cNvPr id="9" name="Google Shape;69;p14">
+            <a:extLst>
+              <a:ext uri="{FF2B5EF4-FFF2-40B4-BE49-F238E27FC236}">
+                <a16:creationId xmlns:a16="http://schemas.microsoft.com/office/drawing/2014/main" id="{88623875-B882-5246-A338-4700DB336C05}"/>
+              </a:ext>
+            </a:extLst>
+          </p:cNvPr>
+          <p:cNvPicPr preferRelativeResize="0"/>
           <p:nvPr/>
         </p:nvPicPr>
         <p:blipFill>
-          <a:blip r:embed="rId2">
-            <a:extLst>
-              <a:ext uri="{28A0092B-C50C-407E-A947-70E740481C1C}">
-                <a14:useLocalDpi xmlns:a14="http://schemas.microsoft.com/office/drawing/2010/main" val="0"/>
-              </a:ext>
-            </a:extLst>
-          </a:blip>
-          <a:srcRect l="11536" r="11536"/>
-          <a:stretch>
-            <a:fillRect/>
-          </a:stretch>
+          <a:blip r:embed="rId2"/>
+          <a:srcRect t="4412" b="4412"/>
+          <a:stretch/>
         </p:blipFill>
-        <p:spPr bwMode="auto">
+        <p:spPr>
           <a:xfrm>
-            <a:off x="9147031" y="129305"/>
-            <a:ext cx="2906116" cy="3777677"/>
+            <a:off x="9310062" y="599638"/>
+            <a:ext cx="2635358" cy="3027139"/>
           </a:xfrm>
           <a:prstGeom prst="rect">
             <a:avLst/>
           </a:prstGeom>
           <a:noFill/>
-          <a:extLst>
-            <a:ext uri="{909E8E84-426E-40DD-AFC4-6F175D3DCCD1}">
-              <a14:hiddenFill xmlns:a14="http://schemas.microsoft.com/office/drawing/2010/main">
-                <a:solidFill>
-                  <a:srgbClr val="FFFFFF"/>
-                </a:solidFill>
-              </a14:hiddenFill>
-            </a:ext>
-          </a:extLst>
+          <a:ln>
+            <a:noFill/>
+          </a:ln>
         </p:spPr>
       </p:pic>
     </p:spTree>
     <p:extLst>
       <p:ext uri="{BB962C8B-B14F-4D97-AF65-F5344CB8AC3E}">
-        <p14:creationId xmlns:p14="http://schemas.microsoft.com/office/powerpoint/2010/main" val="4004722649"/>
+        <p14:creationId xmlns:p14="http://schemas.microsoft.com/office/powerpoint/2010/main" val="3181699665"/>
       </p:ext>
     </p:extLst>
   </p:cSld>
@@ -4718,7 +4139,7 @@
 </p:sld>
 </file>
 
-<file path=ppt/slides/slide5.xml><?xml version="1.0" encoding="utf-8"?>
+<file path=ppt/slides/slide4.xml><?xml version="1.0" encoding="utf-8"?>
 <p:sld xmlns:a="http://schemas.openxmlformats.org/drawingml/2006/main" xmlns:r="http://schemas.openxmlformats.org/officeDocument/2006/relationships" xmlns:p="http://schemas.openxmlformats.org/presentationml/2006/main">
   <p:cSld>
     <p:spTree>
@@ -4780,7 +4201,7 @@
         <p:spPr>
           <a:xfrm>
             <a:off x="960229" y="4725451"/>
-            <a:ext cx="5297138" cy="777687"/>
+            <a:ext cx="5297138" cy="1182189"/>
           </a:xfrm>
           <a:prstGeom prst="rect">
             <a:avLst/>
@@ -5067,7 +4488,7 @@
                 <a:cs typeface="Helvetica Neue Light"/>
                 <a:sym typeface="Helvetica Neue Light"/>
               </a:rPr>
-              <a:t>Emanuele Della Valle</a:t>
+              <a:t>Alessio Bernardo</a:t>
             </a:r>
           </a:p>
           <a:p>
@@ -5087,17 +4508,31 @@
                 <a:cs typeface="Helvetica Neue Light"/>
                 <a:sym typeface="Helvetica Neue Light"/>
               </a:rPr>
-              <a:t>Prof. @ </a:t>
-            </a:r>
-            <a:r>
-              <a:rPr lang="en" dirty="0" err="1">
+              <a:t>PhD Student @ Politecnico di Milano </a:t>
+            </a:r>
+          </a:p>
+          <a:p>
+            <a:pPr marL="177800" indent="-177800">
+              <a:spcBef>
+                <a:spcPts val="0"/>
+              </a:spcBef>
+            </a:pPr>
+            <a:r>
+              <a:rPr lang="it-IT" b="1" dirty="0">
                 <a:latin typeface="Helvetica Neue Light"/>
                 <a:ea typeface="Helvetica Neue Light"/>
                 <a:cs typeface="Helvetica Neue Light"/>
                 <a:sym typeface="Helvetica Neue Light"/>
               </a:rPr>
-              <a:t>Politecnico</a:t>
-            </a:r>
+              <a:t>Emanuele Falzone</a:t>
+            </a:r>
+          </a:p>
+          <a:p>
+            <a:pPr marL="177800" indent="-177800">
+              <a:spcBef>
+                <a:spcPts val="0"/>
+              </a:spcBef>
+            </a:pPr>
             <a:r>
               <a:rPr lang="en" dirty="0">
                 <a:latin typeface="Helvetica Neue Light"/>
@@ -5105,166 +4540,13 @@
                 <a:cs typeface="Helvetica Neue Light"/>
                 <a:sym typeface="Helvetica Neue Light"/>
               </a:rPr>
-              <a:t> di Milano </a:t>
-            </a:r>
-          </a:p>
-          <a:p>
-            <a:pPr marL="177800" indent="-177800">
-              <a:spcBef>
-                <a:spcPts val="0"/>
-              </a:spcBef>
-              <a:buClr>
-                <a:schemeClr val="lt1"/>
-              </a:buClr>
-              <a:buSzPts val="1800"/>
-            </a:pPr>
-            <a:r>
-              <a:rPr lang="en" dirty="0">
-                <a:latin typeface="Helvetica Neue Light"/>
-                <a:ea typeface="Helvetica Neue Light"/>
-                <a:cs typeface="Helvetica Neue Light"/>
-                <a:sym typeface="Helvetica Neue Light"/>
-              </a:rPr>
-              <a:t>Founder &amp; Partner @ </a:t>
-            </a:r>
-            <a:r>
-              <a:rPr lang="en" dirty="0" err="1">
-                <a:latin typeface="Helvetica Neue Light"/>
-                <a:ea typeface="Helvetica Neue Light"/>
-                <a:cs typeface="Helvetica Neue Light"/>
-                <a:sym typeface="Helvetica Neue Light"/>
-              </a:rPr>
-              <a:t>Quantia</a:t>
-            </a:r>
-            <a:r>
-              <a:rPr lang="en" dirty="0">
-                <a:latin typeface="Helvetica Neue Light"/>
-                <a:ea typeface="Helvetica Neue Light"/>
-                <a:cs typeface="Helvetica Neue Light"/>
-                <a:sym typeface="Helvetica Neue Light"/>
-              </a:rPr>
-              <a:t> Consulting</a:t>
-            </a:r>
-          </a:p>
-          <a:p>
-            <a:pPr marL="177800" indent="-177800">
-              <a:spcBef>
-                <a:spcPts val="0"/>
-              </a:spcBef>
-            </a:pPr>
-            <a:r>
-              <a:rPr lang="it-IT" b="1" dirty="0">
-                <a:latin typeface="Helvetica Neue Light"/>
-                <a:ea typeface="Helvetica Neue Light"/>
-                <a:cs typeface="Helvetica Neue Light"/>
-                <a:sym typeface="Helvetica Neue Light"/>
-              </a:rPr>
-              <a:t>Marco Balduini</a:t>
-            </a:r>
-          </a:p>
-          <a:p>
-            <a:pPr marL="177800" indent="-177800">
-              <a:spcBef>
-                <a:spcPts val="0"/>
-              </a:spcBef>
-            </a:pPr>
-            <a:r>
-              <a:rPr lang="it-IT" dirty="0" err="1">
-                <a:latin typeface="Helvetica Neue Light"/>
-                <a:ea typeface="Helvetica Neue Light"/>
-                <a:cs typeface="Helvetica Neue Light"/>
-                <a:sym typeface="Helvetica Neue Light"/>
-              </a:rPr>
-              <a:t>Founder</a:t>
-            </a:r>
-            <a:r>
-              <a:rPr lang="it-IT" dirty="0">
-                <a:latin typeface="Helvetica Neue Light"/>
-                <a:ea typeface="Helvetica Neue Light"/>
-                <a:cs typeface="Helvetica Neue Light"/>
-                <a:sym typeface="Helvetica Neue Light"/>
-              </a:rPr>
-              <a:t> &amp; CEO @ </a:t>
-            </a:r>
-            <a:r>
-              <a:rPr lang="it-IT" dirty="0" err="1">
-                <a:latin typeface="Helvetica Neue Light"/>
-                <a:ea typeface="Helvetica Neue Light"/>
-                <a:cs typeface="Helvetica Neue Light"/>
-                <a:sym typeface="Helvetica Neue Light"/>
-              </a:rPr>
-              <a:t>Quantia</a:t>
-            </a:r>
-            <a:r>
-              <a:rPr lang="it-IT" dirty="0">
-                <a:latin typeface="Helvetica Neue Light"/>
-                <a:ea typeface="Helvetica Neue Light"/>
-                <a:cs typeface="Helvetica Neue Light"/>
-                <a:sym typeface="Helvetica Neue Light"/>
-              </a:rPr>
-              <a:t> </a:t>
-            </a:r>
-            <a:r>
-              <a:rPr lang="it-IT" dirty="0" err="1">
-                <a:latin typeface="Helvetica Neue Light"/>
-                <a:ea typeface="Helvetica Neue Light"/>
-                <a:cs typeface="Helvetica Neue Light"/>
-                <a:sym typeface="Helvetica Neue Light"/>
-              </a:rPr>
-              <a:t>Consulting</a:t>
+              <a:t>PhD Student @ Politecnico di Milano</a:t>
             </a:r>
             <a:endParaRPr lang="it-IT" dirty="0">
               <a:latin typeface="Helvetica Neue Light"/>
               <a:ea typeface="Helvetica Neue Light"/>
-              <a:cs typeface="Helvetica Neue Light"/>
               <a:sym typeface="Helvetica Neue Light"/>
             </a:endParaRPr>
-          </a:p>
-          <a:p>
-            <a:pPr marL="177800" indent="-177800">
-              <a:spcBef>
-                <a:spcPts val="0"/>
-              </a:spcBef>
-            </a:pPr>
-            <a:r>
-              <a:rPr lang="it-IT" b="1" dirty="0">
-                <a:latin typeface="Helvetica Neue Light"/>
-                <a:ea typeface="Helvetica Neue Light"/>
-                <a:sym typeface="Helvetica Neue Light"/>
-              </a:rPr>
-              <a:t>Riccardo Tommasini</a:t>
-            </a:r>
-          </a:p>
-          <a:p>
-            <a:pPr marL="100013" indent="-100013">
-              <a:spcBef>
-                <a:spcPts val="0"/>
-              </a:spcBef>
-            </a:pPr>
-            <a:r>
-              <a:rPr lang="it-IT" dirty="0">
-                <a:latin typeface="Helvetica Neue Light"/>
-                <a:ea typeface="Helvetica Neue Light"/>
-                <a:sym typeface="Helvetica Neue Light"/>
-              </a:rPr>
-              <a:t>Prof. @ </a:t>
-            </a:r>
-            <a:r>
-              <a:rPr lang="it-IT" dirty="0" err="1">
-                <a:latin typeface="Helvetica Neue Light"/>
-                <a:ea typeface="Helvetica Neue Light"/>
-                <a:sym typeface="Helvetica Neue Light"/>
-              </a:rPr>
-              <a:t>University</a:t>
-            </a:r>
-            <a:r>
-              <a:rPr lang="it-IT" dirty="0">
-                <a:latin typeface="Helvetica Neue Light"/>
-                <a:ea typeface="Helvetica Neue Light"/>
-                <a:sym typeface="Helvetica Neue Light"/>
-              </a:rPr>
-              <a:t> of Tartu</a:t>
-            </a:r>
           </a:p>
         </p:txBody>
       </p:sp>

</xml_diff>